<commit_message>
Slides layout and sequence improvements.
</commit_message>
<xml_diff>
--- a/RASD/Slideshow/rasd_show.pptx
+++ b/RASD/Slideshow/rasd_show.pptx
@@ -9,9 +9,9 @@
   </p:notesMasterIdLst>
   <p:sldIdLst>
     <p:sldId id="256" r:id="rId2"/>
-    <p:sldId id="265" r:id="rId3"/>
-    <p:sldId id="264" r:id="rId4"/>
-    <p:sldId id="259" r:id="rId5"/>
+    <p:sldId id="264" r:id="rId3"/>
+    <p:sldId id="259" r:id="rId4"/>
+    <p:sldId id="265" r:id="rId5"/>
     <p:sldId id="258" r:id="rId6"/>
     <p:sldId id="257" r:id="rId7"/>
     <p:sldId id="268" r:id="rId8"/>
@@ -211,7 +211,7 @@
           <a:p>
             <a:fld id="{490CE308-4786-4121-8EEE-F6043383D972}" type="datetimeFigureOut">
               <a:rPr lang="it-IT"/>
-              <a:t>15/11/2016</a:t>
+              <a:t>16/11/2016</a:t>
             </a:fld>
             <a:endParaRPr lang="it-IT"/>
           </a:p>
@@ -1140,7 +1140,7 @@
     </p:spTree>
     <p:extLst>
       <p:ext uri="{BB962C8B-B14F-4D97-AF65-F5344CB8AC3E}">
-        <p14:creationId xmlns:p14="http://schemas.microsoft.com/office/powerpoint/2010/main" val="4241537269"/>
+        <p14:creationId xmlns:p14="http://schemas.microsoft.com/office/powerpoint/2010/main" val="3735892890"/>
       </p:ext>
     </p:extLst>
   </p:cSld>
@@ -1224,7 +1224,7 @@
     </p:spTree>
     <p:extLst>
       <p:ext uri="{BB962C8B-B14F-4D97-AF65-F5344CB8AC3E}">
-        <p14:creationId xmlns:p14="http://schemas.microsoft.com/office/powerpoint/2010/main" val="3735892890"/>
+        <p14:creationId xmlns:p14="http://schemas.microsoft.com/office/powerpoint/2010/main" val="1505750707"/>
       </p:ext>
     </p:extLst>
   </p:cSld>
@@ -1308,7 +1308,7 @@
     </p:spTree>
     <p:extLst>
       <p:ext uri="{BB962C8B-B14F-4D97-AF65-F5344CB8AC3E}">
-        <p14:creationId xmlns:p14="http://schemas.microsoft.com/office/powerpoint/2010/main" val="1505750707"/>
+        <p14:creationId xmlns:p14="http://schemas.microsoft.com/office/powerpoint/2010/main" val="4241537269"/>
       </p:ext>
     </p:extLst>
   </p:cSld>
@@ -1922,7 +1922,7 @@
           <a:p>
             <a:fld id="{4AAD347D-5ACD-4C99-B74B-A9C85AD731AF}" type="datetimeFigureOut">
               <a:rPr lang="en-US" smtClean="0"/>
-              <a:t>11/15/2016</a:t>
+              <a:t>11/16/2016</a:t>
             </a:fld>
             <a:endParaRPr lang="en-US" dirty="0"/>
           </a:p>
@@ -2196,7 +2196,7 @@
           <a:p>
             <a:fld id="{4AAD347D-5ACD-4C99-B74B-A9C85AD731AF}" type="datetimeFigureOut">
               <a:rPr lang="en-US" smtClean="0"/>
-              <a:t>11/15/2016</a:t>
+              <a:t>11/16/2016</a:t>
             </a:fld>
             <a:endParaRPr lang="en-US" dirty="0"/>
           </a:p>
@@ -2390,7 +2390,7 @@
           <a:p>
             <a:fld id="{4AAD347D-5ACD-4C99-B74B-A9C85AD731AF}" type="datetimeFigureOut">
               <a:rPr lang="en-US" smtClean="0"/>
-              <a:t>11/15/2016</a:t>
+              <a:t>11/16/2016</a:t>
             </a:fld>
             <a:endParaRPr lang="en-US" dirty="0"/>
           </a:p>
@@ -2663,7 +2663,7 @@
           <a:p>
             <a:fld id="{4AAD347D-5ACD-4C99-B74B-A9C85AD731AF}" type="datetimeFigureOut">
               <a:rPr lang="en-US" smtClean="0"/>
-              <a:t>11/15/2016</a:t>
+              <a:t>11/16/2016</a:t>
             </a:fld>
             <a:endParaRPr lang="en-US" dirty="0"/>
           </a:p>
@@ -3004,7 +3004,7 @@
           <a:p>
             <a:fld id="{4AAD347D-5ACD-4C99-B74B-A9C85AD731AF}" type="datetimeFigureOut">
               <a:rPr lang="en-US" smtClean="0"/>
-              <a:t>11/15/2016</a:t>
+              <a:t>11/16/2016</a:t>
             </a:fld>
             <a:endParaRPr lang="en-US" dirty="0"/>
           </a:p>
@@ -3627,7 +3627,7 @@
           <a:p>
             <a:fld id="{4AAD347D-5ACD-4C99-B74B-A9C85AD731AF}" type="datetimeFigureOut">
               <a:rPr lang="en-US" smtClean="0"/>
-              <a:t>11/15/2016</a:t>
+              <a:t>11/16/2016</a:t>
             </a:fld>
             <a:endParaRPr lang="en-US" dirty="0"/>
           </a:p>
@@ -4484,7 +4484,7 @@
           <a:p>
             <a:fld id="{4AAD347D-5ACD-4C99-B74B-A9C85AD731AF}" type="datetimeFigureOut">
               <a:rPr lang="en-US" smtClean="0"/>
-              <a:t>11/15/2016</a:t>
+              <a:t>11/16/2016</a:t>
             </a:fld>
             <a:endParaRPr lang="en-US" dirty="0"/>
           </a:p>
@@ -4653,7 +4653,7 @@
           <a:p>
             <a:fld id="{4AAD347D-5ACD-4C99-B74B-A9C85AD731AF}" type="datetimeFigureOut">
               <a:rPr lang="en-US" smtClean="0"/>
-              <a:t>11/15/2016</a:t>
+              <a:t>11/16/2016</a:t>
             </a:fld>
             <a:endParaRPr lang="en-US" dirty="0"/>
           </a:p>
@@ -4832,7 +4832,7 @@
           <a:p>
             <a:fld id="{4AAD347D-5ACD-4C99-B74B-A9C85AD731AF}" type="datetimeFigureOut">
               <a:rPr lang="en-US" smtClean="0"/>
-              <a:t>11/15/2016</a:t>
+              <a:t>11/16/2016</a:t>
             </a:fld>
             <a:endParaRPr lang="en-US" dirty="0"/>
           </a:p>
@@ -5001,7 +5001,7 @@
           <a:p>
             <a:fld id="{4AAD347D-5ACD-4C99-B74B-A9C85AD731AF}" type="datetimeFigureOut">
               <a:rPr lang="en-US" smtClean="0"/>
-              <a:t>11/15/2016</a:t>
+              <a:t>11/16/2016</a:t>
             </a:fld>
             <a:endParaRPr lang="en-US" dirty="0"/>
           </a:p>
@@ -5248,7 +5248,7 @@
           <a:p>
             <a:fld id="{4AAD347D-5ACD-4C99-B74B-A9C85AD731AF}" type="datetimeFigureOut">
               <a:rPr lang="en-US" smtClean="0"/>
-              <a:t>11/15/2016</a:t>
+              <a:t>11/16/2016</a:t>
             </a:fld>
             <a:endParaRPr lang="en-US" dirty="0"/>
           </a:p>
@@ -5538,7 +5538,7 @@
           <a:p>
             <a:fld id="{4AAD347D-5ACD-4C99-B74B-A9C85AD731AF}" type="datetimeFigureOut">
               <a:rPr lang="en-US" smtClean="0"/>
-              <a:t>11/15/2016</a:t>
+              <a:t>11/16/2016</a:t>
             </a:fld>
             <a:endParaRPr lang="en-US" dirty="0"/>
           </a:p>
@@ -5980,7 +5980,7 @@
           <a:p>
             <a:fld id="{4AAD347D-5ACD-4C99-B74B-A9C85AD731AF}" type="datetimeFigureOut">
               <a:rPr lang="en-US" smtClean="0"/>
-              <a:t>11/15/2016</a:t>
+              <a:t>11/16/2016</a:t>
             </a:fld>
             <a:endParaRPr lang="en-US" dirty="0"/>
           </a:p>
@@ -6098,7 +6098,7 @@
           <a:p>
             <a:fld id="{4AAD347D-5ACD-4C99-B74B-A9C85AD731AF}" type="datetimeFigureOut">
               <a:rPr lang="en-US" smtClean="0"/>
-              <a:t>11/15/2016</a:t>
+              <a:t>11/16/2016</a:t>
             </a:fld>
             <a:endParaRPr lang="en-US" dirty="0"/>
           </a:p>
@@ -6194,7 +6194,7 @@
           <a:p>
             <a:fld id="{4AAD347D-5ACD-4C99-B74B-A9C85AD731AF}" type="datetimeFigureOut">
               <a:rPr lang="en-US" smtClean="0"/>
-              <a:t>11/15/2016</a:t>
+              <a:t>11/16/2016</a:t>
             </a:fld>
             <a:endParaRPr lang="en-US" dirty="0"/>
           </a:p>
@@ -6472,7 +6472,7 @@
           <a:p>
             <a:fld id="{4AAD347D-5ACD-4C99-B74B-A9C85AD731AF}" type="datetimeFigureOut">
               <a:rPr lang="en-US" smtClean="0"/>
-              <a:t>11/15/2016</a:t>
+              <a:t>11/16/2016</a:t>
             </a:fld>
             <a:endParaRPr lang="en-US" dirty="0"/>
           </a:p>
@@ -6746,7 +6746,7 @@
           <a:p>
             <a:fld id="{4AAD347D-5ACD-4C99-B74B-A9C85AD731AF}" type="datetimeFigureOut">
               <a:rPr lang="en-US" smtClean="0"/>
-              <a:t>11/15/2016</a:t>
+              <a:t>11/16/2016</a:t>
             </a:fld>
             <a:endParaRPr lang="en-US" dirty="0"/>
           </a:p>
@@ -7174,7 +7174,7 @@
           <a:p>
             <a:fld id="{4AAD347D-5ACD-4C99-B74B-A9C85AD731AF}" type="datetimeFigureOut">
               <a:rPr lang="en-US" smtClean="0"/>
-              <a:t>11/15/2016</a:t>
+              <a:t>11/16/2016</a:t>
             </a:fld>
             <a:endParaRPr lang="en-US" dirty="0"/>
           </a:p>
@@ -8755,6 +8755,28 @@
       </p:grpSpPr>
       <p:sp>
         <p:nvSpPr>
+          <p:cNvPr id="2" name="Title 1"/>
+          <p:cNvSpPr>
+            <a:spLocks noGrp="1"/>
+          </p:cNvSpPr>
+          <p:nvPr>
+            <p:ph type="title"/>
+          </p:nvPr>
+        </p:nvSpPr>
+        <p:spPr/>
+        <p:txBody>
+          <a:bodyPr/>
+          <a:lstStyle/>
+          <a:p>
+            <a:r>
+              <a:rPr lang="EN-US" dirty="0"/>
+              <a:t>GOALS</a:t>
+            </a:r>
+          </a:p>
+        </p:txBody>
+      </p:sp>
+      <p:sp>
+        <p:nvSpPr>
           <p:cNvPr id="3" name="Content Placeholder 2"/>
           <p:cNvSpPr>
             <a:spLocks noGrp="1"/>
@@ -8765,144 +8787,141 @@
         </p:nvSpPr>
         <p:spPr>
           <a:xfrm>
-            <a:off x="276399" y="1549400"/>
-            <a:ext cx="11580639" cy="4699000"/>
+            <a:off x="1103313" y="1316006"/>
+            <a:ext cx="8947150" cy="4932394"/>
           </a:xfrm>
         </p:spPr>
         <p:txBody>
           <a:bodyPr vert="horz" lIns="91440" tIns="45720" rIns="91440" bIns="45720" rtlCol="0" anchor="t">
-            <a:normAutofit fontScale="92500" lnSpcReduction="20000"/>
+            <a:normAutofit/>
           </a:bodyPr>
           <a:lstStyle/>
           <a:p>
-            <a:pPr algn="just"/>
-            <a:r>
-              <a:rPr lang="EN-US" dirty="0">
-                <a:latin typeface="Arial"/>
-              </a:rPr>
-              <a:t>Cars belonging to </a:t>
-            </a:r>
-            <a:r>
-              <a:rPr lang="EN-US" dirty="0" err="1">
-                <a:latin typeface="Arial"/>
-              </a:rPr>
-              <a:t>PowerEnJoy</a:t>
-            </a:r>
-            <a:r>
-              <a:rPr lang="EN-US" dirty="0">
-                <a:latin typeface="Arial"/>
-              </a:rPr>
-              <a:t> service have a clearly recognizable logo. </a:t>
-            </a:r>
-            <a:endParaRPr lang="EN-US" dirty="0"/>
-          </a:p>
-          <a:p>
-            <a:pPr algn="just"/>
-            <a:r>
-              <a:rPr lang="EN-US" dirty="0">
-                <a:latin typeface="Arial"/>
-              </a:rPr>
-              <a:t>Cars are already equipped with onboard infotainment device which is able to provide basic offline navigation services in case of missing Internet connectivity. </a:t>
-            </a:r>
-          </a:p>
-          <a:p>
-            <a:pPr algn="just"/>
-            <a:r>
-              <a:rPr lang="EN-US" dirty="0">
-                <a:latin typeface="Arial"/>
-              </a:rPr>
-              <a:t>All Cars have an interface that is able to provide any kind of data from all sensors available in the car itself. </a:t>
-            </a:r>
-          </a:p>
-          <a:p>
-            <a:pPr algn="just"/>
-            <a:r>
-              <a:rPr lang="EN-US" dirty="0">
-                <a:latin typeface="Arial"/>
-              </a:rPr>
-              <a:t>Availability of the following sensors (or functional equivalents) is assumed: GPS receiver, battery status, core vehicle diagnostic. </a:t>
-            </a:r>
-            <a:endParaRPr lang="EN-US" dirty="0"/>
-          </a:p>
-          <a:p>
-            <a:pPr algn="just"/>
-            <a:r>
-              <a:rPr lang="EN-US" dirty="0">
-                <a:latin typeface="Arial"/>
-              </a:rPr>
-              <a:t>Onboard navigation software will not be developed, an existing solution will be integrated. </a:t>
-            </a:r>
-            <a:endParaRPr lang="EN-US" dirty="0"/>
-          </a:p>
-          <a:p>
-            <a:pPr algn="just"/>
-            <a:r>
-              <a:rPr lang="EN-US" b="1" dirty="0">
-                <a:latin typeface="Arial"/>
-              </a:rPr>
-              <a:t>Predefined Safe Parking Areas are assumed to be under mobile data connectivity service coverage. </a:t>
-            </a:r>
-            <a:endParaRPr lang="EN-US" b="1" dirty="0"/>
-          </a:p>
-          <a:p>
-            <a:pPr algn="just"/>
-            <a:r>
-              <a:rPr lang="EN-US" b="1" dirty="0">
-                <a:latin typeface="Arial"/>
-              </a:rPr>
-              <a:t>Special Parking Areas and exclusive power sockets allocation are pre-determined in such a way that spreading Cars among all the available sockets and filling them all corresponds to the best possible distribution of vehicles. </a:t>
-            </a:r>
-            <a:endParaRPr lang="EN-US" b="1" dirty="0"/>
-          </a:p>
-          <a:p>
-            <a:pPr algn="just"/>
-            <a:r>
-              <a:rPr lang="EN-US" b="1" dirty="0">
-                <a:latin typeface="Arial"/>
-              </a:rPr>
-              <a:t>User’s device used to access the service via mobile app is able to send geolocation data while nearby the reserved Car (i.e. both data connectivity and GPS sensors are functional). </a:t>
-            </a:r>
-            <a:endParaRPr lang="en-US" b="1" dirty="0">
-              <a:latin typeface="Arial"/>
-            </a:endParaRPr>
-          </a:p>
-          <a:p>
-            <a:pPr algn="just"/>
-            <a:endParaRPr lang="EN-US"/>
-          </a:p>
-          <a:p>
-            <a:pPr algn="just"/>
+            <a:r>
+              <a:rPr lang="EN-US" dirty="0"/>
+              <a:t>[G1]  Allow any kind of user to view the map of the available nearby Cars. </a:t>
+            </a:r>
+          </a:p>
+          <a:p>
+            <a:r>
+              <a:rPr lang="EN-US" dirty="0"/>
+              <a:t>[G2]  Allow Visitor user to register to the service. </a:t>
+            </a:r>
+            <a:endParaRPr lang="en-US" dirty="0"/>
+          </a:p>
+          <a:p>
+            <a:r>
+              <a:rPr lang="EN-US" dirty="0"/>
+              <a:t>[G3]  Allow Visitor user to log-in and out as a </a:t>
+            </a:r>
+            <a:r>
+              <a:rPr lang="EN-US" dirty="0" err="1"/>
+              <a:t>PowerUser</a:t>
+            </a:r>
+            <a:r>
+              <a:rPr lang="EN-US" dirty="0"/>
+              <a:t>. </a:t>
+            </a:r>
+            <a:endParaRPr lang="en-US" dirty="0"/>
+          </a:p>
+          <a:p>
+            <a:r>
+              <a:rPr lang="EN-US" dirty="0"/>
+              <a:t>[G4]  Allow </a:t>
+            </a:r>
+            <a:r>
+              <a:rPr lang="EN-US" dirty="0" err="1"/>
+              <a:t>PowerUser</a:t>
+            </a:r>
+            <a:r>
+              <a:rPr lang="EN-US" dirty="0"/>
+              <a:t> to check the status of the Car. </a:t>
+            </a:r>
+            <a:endParaRPr lang="en-US" dirty="0"/>
+          </a:p>
+          <a:p>
+            <a:r>
+              <a:rPr lang="EN-US" dirty="0"/>
+              <a:t>[G5]  Allow </a:t>
+            </a:r>
+            <a:r>
+              <a:rPr lang="EN-US" dirty="0" err="1"/>
+              <a:t>PowerUser</a:t>
+            </a:r>
+            <a:r>
+              <a:rPr lang="EN-US" dirty="0"/>
+              <a:t> to reserve a Car. </a:t>
+            </a:r>
+            <a:endParaRPr lang="en-US" dirty="0"/>
+          </a:p>
+          <a:p>
+            <a:r>
+              <a:rPr lang="EN-US" dirty="0"/>
+              <a:t>[G6]  Allow </a:t>
+            </a:r>
+            <a:r>
+              <a:rPr lang="EN-US" dirty="0" err="1"/>
+              <a:t>PowerUser</a:t>
+            </a:r>
+            <a:r>
+              <a:rPr lang="EN-US" dirty="0"/>
+              <a:t> to cancel a reservation. </a:t>
+            </a:r>
+            <a:endParaRPr lang="en-US" dirty="0"/>
+          </a:p>
+          <a:p>
+            <a:r>
+              <a:rPr lang="EN-US" dirty="0"/>
+              <a:t>[G7]  Allow </a:t>
+            </a:r>
+            <a:r>
+              <a:rPr lang="EN-US" dirty="0" err="1"/>
+              <a:t>PowerUser</a:t>
+            </a:r>
+            <a:r>
+              <a:rPr lang="EN-US" dirty="0"/>
+              <a:t> to check the position of the reserved car. </a:t>
+            </a:r>
+            <a:endParaRPr lang="en-US" dirty="0"/>
+          </a:p>
+          <a:p>
+            <a:r>
+              <a:rPr lang="EN-US" b="1" dirty="0"/>
+              <a:t>[G8]  Allow </a:t>
+            </a:r>
+            <a:r>
+              <a:rPr lang="EN-US" b="1" dirty="0" err="1"/>
+              <a:t>PowerUser</a:t>
+            </a:r>
+            <a:r>
+              <a:rPr lang="EN-US" b="1" dirty="0"/>
+              <a:t> to unlock and enter the Car when inside the specific range. </a:t>
+            </a:r>
+            <a:endParaRPr lang="en-US" b="1" dirty="0"/>
+          </a:p>
+          <a:p>
+            <a:r>
+              <a:rPr lang="EN-US" dirty="0"/>
+              <a:t>[G9]  Allow </a:t>
+            </a:r>
+            <a:r>
+              <a:rPr lang="EN-US" dirty="0" err="1"/>
+              <a:t>PowerUser</a:t>
+            </a:r>
+            <a:r>
+              <a:rPr lang="EN-US" dirty="0"/>
+              <a:t> to get driving directions to his destination. </a:t>
+            </a:r>
+          </a:p>
+          <a:p>
             <a:endParaRPr lang="en-US"/>
-          </a:p>
-        </p:txBody>
-      </p:sp>
-      <p:sp>
-        <p:nvSpPr>
-          <p:cNvPr id="4" name="Titolo 3"/>
-          <p:cNvSpPr>
-            <a:spLocks noGrp="1"/>
-          </p:cNvSpPr>
-          <p:nvPr>
-            <p:ph type="title"/>
-          </p:nvPr>
-        </p:nvSpPr>
-        <p:spPr/>
-        <p:txBody>
-          <a:bodyPr/>
-          <a:lstStyle/>
-          <a:p>
-            <a:r>
-              <a:rPr lang="IT-IT" dirty="0"/>
-              <a:t>WORLD ASSUMPTIONS</a:t>
-            </a:r>
-            <a:endParaRPr lang="it-IT" dirty="0"/>
           </a:p>
         </p:txBody>
       </p:sp>
     </p:spTree>
     <p:extLst>
       <p:ext uri="{BB962C8B-B14F-4D97-AF65-F5344CB8AC3E}">
-        <p14:creationId xmlns:p14="http://schemas.microsoft.com/office/powerpoint/2010/main" val="2352128563"/>
+        <p14:creationId xmlns:p14="http://schemas.microsoft.com/office/powerpoint/2010/main" val="2376774624"/>
       </p:ext>
     </p:extLst>
   </p:cSld>
@@ -8931,28 +8950,6 @@
       </p:grpSpPr>
       <p:sp>
         <p:nvSpPr>
-          <p:cNvPr id="2" name="Title 1"/>
-          <p:cNvSpPr>
-            <a:spLocks noGrp="1"/>
-          </p:cNvSpPr>
-          <p:nvPr>
-            <p:ph type="title"/>
-          </p:nvPr>
-        </p:nvSpPr>
-        <p:spPr/>
-        <p:txBody>
-          <a:bodyPr/>
-          <a:lstStyle/>
-          <a:p>
-            <a:r>
-              <a:rPr lang="EN-US" dirty="0"/>
-              <a:t>GOALS</a:t>
-            </a:r>
-          </a:p>
-        </p:txBody>
-      </p:sp>
-      <p:sp>
-        <p:nvSpPr>
           <p:cNvPr id="3" name="Content Placeholder 2"/>
           <p:cNvSpPr>
             <a:spLocks noGrp="1"/>
@@ -8963,131 +8960,181 @@
         </p:nvSpPr>
         <p:spPr>
           <a:xfrm>
-            <a:off x="1103313" y="1316006"/>
-            <a:ext cx="8947150" cy="4932394"/>
+            <a:off x="1028700" y="510604"/>
+            <a:ext cx="8947150" cy="5552059"/>
           </a:xfrm>
         </p:spPr>
         <p:txBody>
           <a:bodyPr vert="horz" lIns="91440" tIns="45720" rIns="91440" bIns="45720" rtlCol="0" anchor="t">
-            <a:normAutofit/>
+            <a:normAutofit lnSpcReduction="10000"/>
           </a:bodyPr>
           <a:lstStyle/>
           <a:p>
-            <a:r>
-              <a:rPr lang="EN-US" dirty="0"/>
-              <a:t>[G1]  Allow any kind of user to view the map of the available nearby Cars. </a:t>
-            </a:r>
-          </a:p>
-          <a:p>
-            <a:r>
-              <a:rPr lang="EN-US" dirty="0"/>
-              <a:t>[G2]  Allow Visitor user to register to the service. </a:t>
-            </a:r>
-            <a:endParaRPr lang="en-US" dirty="0"/>
-          </a:p>
-          <a:p>
-            <a:r>
-              <a:rPr lang="EN-US" dirty="0"/>
-              <a:t>[G3]  Allow Visitor user to log-in and out as a </a:t>
-            </a:r>
-            <a:r>
-              <a:rPr lang="EN-US" dirty="0" err="1"/>
+            <a:endParaRPr lang="it-IT">
+              <a:latin typeface="Arial"/>
+            </a:endParaRPr>
+          </a:p>
+          <a:p>
+            <a:r>
+              <a:rPr lang="EN-US" dirty="0">
+                <a:latin typeface="Century Gothic"/>
+              </a:rPr>
+              <a:t>[G10]  Bill the </a:t>
+            </a:r>
+            <a:r>
+              <a:rPr lang="EN-US" dirty="0" err="1">
+                <a:latin typeface="Century Gothic"/>
+              </a:rPr>
               <a:t>PowerUser</a:t>
             </a:r>
             <a:r>
-              <a:rPr lang="EN-US" dirty="0"/>
-              <a:t>. </a:t>
-            </a:r>
-            <a:endParaRPr lang="en-US" dirty="0"/>
-          </a:p>
-          <a:p>
-            <a:r>
-              <a:rPr lang="EN-US" dirty="0"/>
-              <a:t>[G4]  Allow </a:t>
-            </a:r>
-            <a:r>
-              <a:rPr lang="EN-US" dirty="0" err="1"/>
+              <a:rPr lang="EN-US" dirty="0">
+                <a:latin typeface="Century Gothic"/>
+              </a:rPr>
+              <a:t> for the amount of time spent riding a Car. </a:t>
+            </a:r>
+          </a:p>
+          <a:p>
+            <a:r>
+              <a:rPr lang="EN-US" dirty="0">
+                <a:latin typeface="Century Gothic"/>
+              </a:rPr>
+              <a:t>[G11]  Allow </a:t>
+            </a:r>
+            <a:r>
+              <a:rPr lang="EN-US" dirty="0" err="1">
+                <a:latin typeface="Century Gothic"/>
+              </a:rPr>
               <a:t>PowerUser</a:t>
             </a:r>
             <a:r>
-              <a:rPr lang="EN-US" dirty="0"/>
-              <a:t> to check the status of the Car. </a:t>
-            </a:r>
-            <a:endParaRPr lang="en-US" dirty="0"/>
-          </a:p>
-          <a:p>
-            <a:r>
-              <a:rPr lang="EN-US" dirty="0"/>
-              <a:t>[G5]  Allow </a:t>
-            </a:r>
-            <a:r>
-              <a:rPr lang="EN-US" dirty="0" err="1"/>
+              <a:rPr lang="EN-US" dirty="0">
+                <a:latin typeface="Century Gothic"/>
+              </a:rPr>
+              <a:t> to see a list of the closest Special Parking Areas to his destination. </a:t>
+            </a:r>
+            <a:endParaRPr lang="en-US" dirty="0">
+              <a:latin typeface="Century Gothic"/>
+            </a:endParaRPr>
+          </a:p>
+          <a:p>
+            <a:r>
+              <a:rPr lang="EN-US" dirty="0">
+                <a:latin typeface="Century Gothic"/>
+              </a:rPr>
+              <a:t>[G12]  Allow </a:t>
+            </a:r>
+            <a:r>
+              <a:rPr lang="EN-US" dirty="0" err="1">
+                <a:latin typeface="Century Gothic"/>
+              </a:rPr>
               <a:t>PowerUser</a:t>
             </a:r>
             <a:r>
-              <a:rPr lang="EN-US" dirty="0"/>
-              <a:t> to reserve a Car. </a:t>
-            </a:r>
-            <a:endParaRPr lang="en-US" dirty="0"/>
-          </a:p>
-          <a:p>
-            <a:r>
-              <a:rPr lang="EN-US" dirty="0"/>
-              <a:t>[G6]  Allow </a:t>
-            </a:r>
-            <a:r>
-              <a:rPr lang="EN-US" dirty="0" err="1"/>
+              <a:rPr lang="EN-US" dirty="0">
+                <a:latin typeface="Century Gothic"/>
+              </a:rPr>
+              <a:t> to keep track of the current charged fare. </a:t>
+            </a:r>
+            <a:endParaRPr lang="en-US" dirty="0">
+              <a:latin typeface="Century Gothic"/>
+            </a:endParaRPr>
+          </a:p>
+          <a:p>
+            <a:r>
+              <a:rPr lang="EN-US" dirty="0">
+                <a:latin typeface="Century Gothic"/>
+              </a:rPr>
+              <a:t>[G13]  Allow </a:t>
+            </a:r>
+            <a:r>
+              <a:rPr lang="EN-US" dirty="0" err="1">
+                <a:latin typeface="Century Gothic"/>
+              </a:rPr>
               <a:t>PowerUser</a:t>
             </a:r>
             <a:r>
-              <a:rPr lang="EN-US" dirty="0"/>
-              <a:t> to cancel a reservation. </a:t>
-            </a:r>
-            <a:endParaRPr lang="en-US" dirty="0"/>
-          </a:p>
-          <a:p>
-            <a:r>
-              <a:rPr lang="EN-US" dirty="0"/>
-              <a:t>[G7]  Allow </a:t>
-            </a:r>
-            <a:r>
-              <a:rPr lang="EN-US" dirty="0" err="1"/>
+              <a:rPr lang="EN-US" dirty="0">
+                <a:latin typeface="Century Gothic"/>
+              </a:rPr>
+              <a:t> to check whether he can be eligible for any discount or penalty. </a:t>
+            </a:r>
+            <a:endParaRPr lang="en-US" dirty="0">
+              <a:latin typeface="Century Gothic"/>
+            </a:endParaRPr>
+          </a:p>
+          <a:p>
+            <a:r>
+              <a:rPr lang="EN-US" b="1" dirty="0">
+                <a:latin typeface="Century Gothic"/>
+              </a:rPr>
+              <a:t>[G14]  Allow </a:t>
+            </a:r>
+            <a:r>
+              <a:rPr lang="EN-US" b="1" dirty="0" err="1">
+                <a:latin typeface="Century Gothic"/>
+              </a:rPr>
               <a:t>PowerUser</a:t>
             </a:r>
             <a:r>
-              <a:rPr lang="EN-US" dirty="0"/>
-              <a:t> to check the position of the reserved car. </a:t>
-            </a:r>
-            <a:endParaRPr lang="en-US" dirty="0"/>
-          </a:p>
-          <a:p>
-            <a:r>
-              <a:rPr lang="EN-US" b="1" dirty="0"/>
-              <a:t>[G8]  Allow </a:t>
-            </a:r>
-            <a:r>
-              <a:rPr lang="EN-US" b="1" dirty="0" err="1"/>
+              <a:rPr lang="EN-US" b="1" dirty="0">
+                <a:latin typeface="Century Gothic"/>
+              </a:rPr>
+              <a:t> to get a money saving alternative destination. </a:t>
+            </a:r>
+            <a:endParaRPr lang="en-US" b="1" dirty="0">
+              <a:latin typeface="Century Gothic"/>
+            </a:endParaRPr>
+          </a:p>
+          <a:p>
+            <a:r>
+              <a:rPr lang="EN-US" b="1" dirty="0">
+                <a:latin typeface="Century Gothic"/>
+              </a:rPr>
+              <a:t>[G15]  Allow the system to lock the Car in a Safe Parking Area at the end of the ride. </a:t>
+            </a:r>
+            <a:endParaRPr lang="en-US" b="1" dirty="0">
+              <a:latin typeface="Century Gothic"/>
+            </a:endParaRPr>
+          </a:p>
+          <a:p>
+            <a:r>
+              <a:rPr lang="EN-US" dirty="0">
+                <a:latin typeface="Century Gothic"/>
+              </a:rPr>
+              <a:t>[G16]  Allow the system to apply penalty or discount according to the given criteria. </a:t>
+            </a:r>
+            <a:endParaRPr lang="en-US" dirty="0">
+              <a:latin typeface="Century Gothic"/>
+            </a:endParaRPr>
+          </a:p>
+          <a:p>
+            <a:r>
+              <a:rPr lang="EN-US" dirty="0">
+                <a:latin typeface="Century Gothic"/>
+              </a:rPr>
+              <a:t>[G17]  Let the system bill the </a:t>
+            </a:r>
+            <a:r>
+              <a:rPr lang="EN-US" dirty="0" err="1">
+                <a:latin typeface="Century Gothic"/>
+              </a:rPr>
               <a:t>PowerUser</a:t>
             </a:r>
             <a:r>
-              <a:rPr lang="EN-US" b="1" dirty="0"/>
-              <a:t> to unlock and enter the Car when inside the specific range. </a:t>
-            </a:r>
-            <a:endParaRPr lang="en-US" b="1" dirty="0"/>
-          </a:p>
-          <a:p>
-            <a:r>
-              <a:rPr lang="EN-US" dirty="0"/>
-              <a:t>[G9]  Allow </a:t>
-            </a:r>
-            <a:r>
-              <a:rPr lang="EN-US" dirty="0" err="1"/>
-              <a:t>PowerUser</a:t>
-            </a:r>
-            <a:r>
-              <a:rPr lang="EN-US" dirty="0"/>
-              <a:t> to get driving directions to his destination. </a:t>
-            </a:r>
+              <a:rPr lang="EN-US" dirty="0">
+                <a:latin typeface="Century Gothic"/>
+              </a:rPr>
+              <a:t> for the total ride fare and issue a payment request for that amount at the end of the ride. </a:t>
+            </a:r>
+            <a:endParaRPr lang="en-US" dirty="0">
+              <a:latin typeface="Century Gothic"/>
+            </a:endParaRPr>
+          </a:p>
+          <a:p>
+            <a:endParaRPr lang="EN-US">
+              <a:latin typeface="Arial"/>
+            </a:endParaRPr>
           </a:p>
           <a:p>
             <a:endParaRPr lang="en-US"/>
@@ -9097,7 +9144,7 @@
     </p:spTree>
     <p:extLst>
       <p:ext uri="{BB962C8B-B14F-4D97-AF65-F5344CB8AC3E}">
-        <p14:creationId xmlns:p14="http://schemas.microsoft.com/office/powerpoint/2010/main" val="2376774624"/>
+        <p14:creationId xmlns:p14="http://schemas.microsoft.com/office/powerpoint/2010/main" val="1290043637"/>
       </p:ext>
     </p:extLst>
   </p:cSld>
@@ -9136,191 +9183,144 @@
         </p:nvSpPr>
         <p:spPr>
           <a:xfrm>
-            <a:off x="1028700" y="510604"/>
-            <a:ext cx="8947150" cy="5552059"/>
+            <a:off x="276399" y="1549400"/>
+            <a:ext cx="11580639" cy="4699000"/>
           </a:xfrm>
         </p:spPr>
         <p:txBody>
           <a:bodyPr vert="horz" lIns="91440" tIns="45720" rIns="91440" bIns="45720" rtlCol="0" anchor="t">
-            <a:normAutofit lnSpcReduction="10000"/>
+            <a:normAutofit fontScale="92500" lnSpcReduction="10000"/>
           </a:bodyPr>
           <a:lstStyle/>
           <a:p>
-            <a:endParaRPr lang="it-IT">
+            <a:pPr algn="just"/>
+            <a:r>
+              <a:rPr lang="EN-US" sz="1700" dirty="0">
+                <a:latin typeface="Arial"/>
+              </a:rPr>
+              <a:t>Cars belonging to </a:t>
+            </a:r>
+            <a:r>
+              <a:rPr lang="EN-US" sz="1700" dirty="0" err="1">
+                <a:latin typeface="Arial"/>
+              </a:rPr>
+              <a:t>PowerEnJoy</a:t>
+            </a:r>
+            <a:r>
+              <a:rPr lang="EN-US" sz="1700" dirty="0">
+                <a:latin typeface="Arial"/>
+              </a:rPr>
+              <a:t> service have a clearly recognizable logo. </a:t>
+            </a:r>
+            <a:endParaRPr lang="EN-US" sz="1700" dirty="0"/>
+          </a:p>
+          <a:p>
+            <a:pPr algn="just"/>
+            <a:r>
+              <a:rPr lang="EN-US" sz="1700" dirty="0">
+                <a:latin typeface="Arial"/>
+              </a:rPr>
+              <a:t>Cars are already equipped with onboard infotainment device which is able to provide basic offline navigation services in case of missing Internet connectivity. </a:t>
+            </a:r>
+          </a:p>
+          <a:p>
+            <a:pPr algn="just"/>
+            <a:r>
+              <a:rPr lang="EN-US" sz="1700" dirty="0">
+                <a:latin typeface="Arial"/>
+              </a:rPr>
+              <a:t>All Cars have an interface that is able to provide any kind of data from all sensors available in the car itself. </a:t>
+            </a:r>
+          </a:p>
+          <a:p>
+            <a:pPr algn="just"/>
+            <a:r>
+              <a:rPr lang="EN-US" sz="1700" dirty="0">
+                <a:latin typeface="Arial"/>
+              </a:rPr>
+              <a:t>Availability of the following sensors (or functional equivalents) is assumed: GPS receiver, battery status, core vehicle diagnostic. </a:t>
+            </a:r>
+            <a:endParaRPr lang="EN-US" sz="1700" dirty="0"/>
+          </a:p>
+          <a:p>
+            <a:pPr algn="just"/>
+            <a:r>
+              <a:rPr lang="EN-US" sz="1700" dirty="0">
+                <a:latin typeface="Arial"/>
+              </a:rPr>
+              <a:t>Onboard navigation software will not be developed, an existing solution will be integrated. </a:t>
+            </a:r>
+            <a:endParaRPr lang="EN-US" sz="1700" dirty="0"/>
+          </a:p>
+          <a:p>
+            <a:pPr algn="just"/>
+            <a:r>
+              <a:rPr lang="EN-US" b="1" dirty="0">
+                <a:latin typeface="Arial"/>
+              </a:rPr>
+              <a:t>Predefined Safe Parking Areas are assumed to be under mobile data connectivity service coverage. </a:t>
+            </a:r>
+            <a:endParaRPr lang="EN-US" b="1" dirty="0"/>
+          </a:p>
+          <a:p>
+            <a:pPr algn="just"/>
+            <a:r>
+              <a:rPr lang="EN-US" b="1" dirty="0">
+                <a:latin typeface="Arial"/>
+              </a:rPr>
+              <a:t>Special Parking Areas and exclusive power sockets allocation are pre-determined in such a way that spreading Cars among all the available sockets and filling them all corresponds to the best possible distribution of vehicles. </a:t>
+            </a:r>
+            <a:endParaRPr lang="EN-US" b="1" dirty="0"/>
+          </a:p>
+          <a:p>
+            <a:pPr algn="just"/>
+            <a:r>
+              <a:rPr lang="EN-US" b="1" dirty="0">
+                <a:latin typeface="Arial"/>
+              </a:rPr>
+              <a:t>User’s device used to access the service via mobile app is able to send geolocation data while nearby the reserved Car (i.e. both data connectivity and GPS sensors are functional). </a:t>
+            </a:r>
+            <a:endParaRPr lang="en-US" b="1" dirty="0">
               <a:latin typeface="Arial"/>
             </a:endParaRPr>
           </a:p>
           <a:p>
-            <a:r>
-              <a:rPr lang="EN-US" dirty="0">
-                <a:latin typeface="Century Gothic"/>
-              </a:rPr>
-              <a:t>[G10]  Bill the </a:t>
-            </a:r>
-            <a:r>
-              <a:rPr lang="EN-US" dirty="0" err="1">
-                <a:latin typeface="Century Gothic"/>
-              </a:rPr>
-              <a:t>PowerUser</a:t>
-            </a:r>
-            <a:r>
-              <a:rPr lang="EN-US" dirty="0">
-                <a:latin typeface="Century Gothic"/>
-              </a:rPr>
-              <a:t> for the amount of time spent riding a Car. </a:t>
-            </a:r>
-          </a:p>
-          <a:p>
-            <a:r>
-              <a:rPr lang="EN-US" dirty="0">
-                <a:latin typeface="Century Gothic"/>
-              </a:rPr>
-              <a:t>[G11]  Allow </a:t>
-            </a:r>
-            <a:r>
-              <a:rPr lang="EN-US" dirty="0" err="1">
-                <a:latin typeface="Century Gothic"/>
-              </a:rPr>
-              <a:t>PowerUser</a:t>
-            </a:r>
-            <a:r>
-              <a:rPr lang="EN-US" dirty="0">
-                <a:latin typeface="Century Gothic"/>
-              </a:rPr>
-              <a:t> to see a list of the closest Special Parking Areas to his destination. </a:t>
-            </a:r>
-            <a:endParaRPr lang="en-US" dirty="0">
-              <a:latin typeface="Century Gothic"/>
-            </a:endParaRPr>
-          </a:p>
-          <a:p>
-            <a:r>
-              <a:rPr lang="EN-US" dirty="0">
-                <a:latin typeface="Century Gothic"/>
-              </a:rPr>
-              <a:t>[G12]  Allow </a:t>
-            </a:r>
-            <a:r>
-              <a:rPr lang="EN-US" dirty="0" err="1">
-                <a:latin typeface="Century Gothic"/>
-              </a:rPr>
-              <a:t>PowerUser</a:t>
-            </a:r>
-            <a:r>
-              <a:rPr lang="EN-US" dirty="0">
-                <a:latin typeface="Century Gothic"/>
-              </a:rPr>
-              <a:t> to keep track of the current charged fare. </a:t>
-            </a:r>
-            <a:endParaRPr lang="en-US" dirty="0">
-              <a:latin typeface="Century Gothic"/>
-            </a:endParaRPr>
-          </a:p>
-          <a:p>
-            <a:r>
-              <a:rPr lang="EN-US" dirty="0">
-                <a:latin typeface="Century Gothic"/>
-              </a:rPr>
-              <a:t>[G13]  Allow </a:t>
-            </a:r>
-            <a:r>
-              <a:rPr lang="EN-US" dirty="0" err="1">
-                <a:latin typeface="Century Gothic"/>
-              </a:rPr>
-              <a:t>PowerUser</a:t>
-            </a:r>
-            <a:r>
-              <a:rPr lang="EN-US" dirty="0">
-                <a:latin typeface="Century Gothic"/>
-              </a:rPr>
-              <a:t> to check whether he can be eligible for any discount or penalty. </a:t>
-            </a:r>
-            <a:endParaRPr lang="en-US" dirty="0">
-              <a:latin typeface="Century Gothic"/>
-            </a:endParaRPr>
-          </a:p>
-          <a:p>
-            <a:r>
-              <a:rPr lang="EN-US" b="1" dirty="0">
-                <a:latin typeface="Century Gothic"/>
-              </a:rPr>
-              <a:t>[G14]  Allow </a:t>
-            </a:r>
-            <a:r>
-              <a:rPr lang="EN-US" b="1" dirty="0" err="1">
-                <a:latin typeface="Century Gothic"/>
-              </a:rPr>
-              <a:t>PowerUser</a:t>
-            </a:r>
-            <a:r>
-              <a:rPr lang="EN-US" b="1" dirty="0">
-                <a:latin typeface="Century Gothic"/>
-              </a:rPr>
-              <a:t> to get a money saving alternative destination. </a:t>
-            </a:r>
-            <a:endParaRPr lang="en-US" b="1" dirty="0">
-              <a:latin typeface="Century Gothic"/>
-            </a:endParaRPr>
-          </a:p>
-          <a:p>
-            <a:r>
-              <a:rPr lang="EN-US" b="1" dirty="0">
-                <a:latin typeface="Century Gothic"/>
-              </a:rPr>
-              <a:t>[G15]  Allow the system to lock the Car in a Safe Parking Area at the end of the ride. </a:t>
-            </a:r>
-            <a:endParaRPr lang="en-US" b="1" dirty="0">
-              <a:latin typeface="Century Gothic"/>
-            </a:endParaRPr>
-          </a:p>
-          <a:p>
-            <a:r>
-              <a:rPr lang="EN-US" dirty="0">
-                <a:latin typeface="Century Gothic"/>
-              </a:rPr>
-              <a:t>[G16]  Allow the system to apply penalty or discount according to the given criteria. </a:t>
-            </a:r>
-            <a:endParaRPr lang="en-US" dirty="0">
-              <a:latin typeface="Century Gothic"/>
-            </a:endParaRPr>
-          </a:p>
-          <a:p>
-            <a:r>
-              <a:rPr lang="EN-US" dirty="0">
-                <a:latin typeface="Century Gothic"/>
-              </a:rPr>
-              <a:t>[G17]  Let the system bill the </a:t>
-            </a:r>
-            <a:r>
-              <a:rPr lang="EN-US" dirty="0" err="1">
-                <a:latin typeface="Century Gothic"/>
-              </a:rPr>
-              <a:t>PowerUser</a:t>
-            </a:r>
-            <a:r>
-              <a:rPr lang="EN-US" dirty="0">
-                <a:latin typeface="Century Gothic"/>
-              </a:rPr>
-              <a:t> for the total ride fare and issue a payment request for that amount at the end of the ride. </a:t>
-            </a:r>
-            <a:endParaRPr lang="en-US" dirty="0">
-              <a:latin typeface="Century Gothic"/>
-            </a:endParaRPr>
-          </a:p>
-          <a:p>
-            <a:endParaRPr lang="EN-US">
-              <a:latin typeface="Arial"/>
-            </a:endParaRPr>
-          </a:p>
-          <a:p>
-            <a:endParaRPr lang="en-US"/>
+            <a:pPr algn="just"/>
+            <a:endParaRPr lang="EN-US" dirty="0"/>
+          </a:p>
+          <a:p>
+            <a:pPr algn="just"/>
+            <a:endParaRPr lang="en-US" dirty="0"/>
+          </a:p>
+        </p:txBody>
+      </p:sp>
+      <p:sp>
+        <p:nvSpPr>
+          <p:cNvPr id="4" name="Titolo 3"/>
+          <p:cNvSpPr>
+            <a:spLocks noGrp="1"/>
+          </p:cNvSpPr>
+          <p:nvPr>
+            <p:ph type="title"/>
+          </p:nvPr>
+        </p:nvSpPr>
+        <p:spPr/>
+        <p:txBody>
+          <a:bodyPr/>
+          <a:lstStyle/>
+          <a:p>
+            <a:r>
+              <a:rPr lang="IT-IT" dirty="0"/>
+              <a:t>WORLD ASSUMPTIONS</a:t>
+            </a:r>
+            <a:endParaRPr lang="it-IT" dirty="0"/>
           </a:p>
         </p:txBody>
       </p:sp>
     </p:spTree>
     <p:extLst>
       <p:ext uri="{BB962C8B-B14F-4D97-AF65-F5344CB8AC3E}">
-        <p14:creationId xmlns:p14="http://schemas.microsoft.com/office/powerpoint/2010/main" val="1290043637"/>
+        <p14:creationId xmlns:p14="http://schemas.microsoft.com/office/powerpoint/2010/main" val="2352128563"/>
       </p:ext>
     </p:extLst>
   </p:cSld>
@@ -9404,6 +9404,24 @@
               <a:rPr lang="EN-US" sz="2400" dirty="0"/>
               <a:t>Assumption: User already booked a car.</a:t>
             </a:r>
+          </a:p>
+          <a:p>
+            <a:r>
+              <a:rPr lang="EN-US" sz="2800" dirty="0"/>
+              <a:t>Money Saving Options [G14]</a:t>
+            </a:r>
+            <a:endParaRPr lang="en-US" sz="2800" dirty="0"/>
+          </a:p>
+          <a:p>
+            <a:pPr lvl="1"/>
+            <a:r>
+              <a:rPr lang="EN-US" sz="2400" dirty="0"/>
+              <a:t>Assumption: The closest Special Parking Area is known.</a:t>
+            </a:r>
+            <a:r>
+              <a:rPr lang="EN-US" sz="2800" dirty="0"/>
+              <a:t> </a:t>
+            </a:r>
             <a:endParaRPr lang="en-US" sz="2400" dirty="0"/>
           </a:p>
           <a:p>
@@ -9420,29 +9438,6 @@
               <a:t>Assumption: Car is not moving.</a:t>
             </a:r>
             <a:endParaRPr lang="en-US" sz="2400" dirty="0"/>
-          </a:p>
-          <a:p>
-            <a:r>
-              <a:rPr lang="EN-US" sz="2800" dirty="0"/>
-              <a:t>Money Saving Options [G14]</a:t>
-            </a:r>
-            <a:endParaRPr lang="en-US" sz="2800" dirty="0"/>
-          </a:p>
-          <a:p>
-            <a:pPr lvl="1"/>
-            <a:r>
-              <a:rPr lang="EN-US" sz="2400" dirty="0"/>
-              <a:t>Assumption: The closest Special Parking Area </a:t>
-            </a:r>
-            <a:r>
-              <a:rPr lang="EN-US" sz="2400"/>
-              <a:t>is known.</a:t>
-            </a:r>
-            <a:r>
-              <a:rPr lang="EN-US" sz="2800" dirty="0"/>
-              <a:t> </a:t>
-            </a:r>
-            <a:endParaRPr lang="en-US" sz="2800" dirty="0"/>
           </a:p>
         </p:txBody>
       </p:sp>

</xml_diff>